<commit_message>
update benchmarking analyses and updated manuscript files
</commit_message>
<xml_diff>
--- a/analyses/benchmarking/results/Figures/connectivity.pptx
+++ b/analyses/benchmarking/results/Figures/connectivity.pptx
@@ -208,7 +208,7 @@
           <a:p>
             <a:fld id="{A7A3F7B9-212E-D04D-B6AD-74F1271D4D0F}" type="datetimeFigureOut">
               <a:rPr lang="en-US" smtClean="0"/>
-              <a:t>1/26/18</a:t>
+              <a:t>2/10/18</a:t>
             </a:fld>
             <a:endParaRPr lang="en-US"/>
           </a:p>
@@ -607,7 +607,7 @@
           <a:p>
             <a:fld id="{93E1D4DC-B837-664D-AE6B-C6841DC5E297}" type="datetimeFigureOut">
               <a:rPr lang="en-US" smtClean="0"/>
-              <a:t>1/26/18</a:t>
+              <a:t>2/10/18</a:t>
             </a:fld>
             <a:endParaRPr lang="en-US"/>
           </a:p>
@@ -772,7 +772,7 @@
           <a:p>
             <a:fld id="{93E1D4DC-B837-664D-AE6B-C6841DC5E297}" type="datetimeFigureOut">
               <a:rPr lang="en-US" smtClean="0"/>
-              <a:t>1/26/18</a:t>
+              <a:t>2/10/18</a:t>
             </a:fld>
             <a:endParaRPr lang="en-US"/>
           </a:p>
@@ -947,7 +947,7 @@
           <a:p>
             <a:fld id="{93E1D4DC-B837-664D-AE6B-C6841DC5E297}" type="datetimeFigureOut">
               <a:rPr lang="en-US" smtClean="0"/>
-              <a:t>1/26/18</a:t>
+              <a:t>2/10/18</a:t>
             </a:fld>
             <a:endParaRPr lang="en-US"/>
           </a:p>
@@ -1112,7 +1112,7 @@
           <a:p>
             <a:fld id="{93E1D4DC-B837-664D-AE6B-C6841DC5E297}" type="datetimeFigureOut">
               <a:rPr lang="en-US" smtClean="0"/>
-              <a:t>1/26/18</a:t>
+              <a:t>2/10/18</a:t>
             </a:fld>
             <a:endParaRPr lang="en-US"/>
           </a:p>
@@ -1351,7 +1351,7 @@
           <a:p>
             <a:fld id="{93E1D4DC-B837-664D-AE6B-C6841DC5E297}" type="datetimeFigureOut">
               <a:rPr lang="en-US" smtClean="0"/>
-              <a:t>1/26/18</a:t>
+              <a:t>2/10/18</a:t>
             </a:fld>
             <a:endParaRPr lang="en-US"/>
           </a:p>
@@ -1578,7 +1578,7 @@
           <a:p>
             <a:fld id="{93E1D4DC-B837-664D-AE6B-C6841DC5E297}" type="datetimeFigureOut">
               <a:rPr lang="en-US" smtClean="0"/>
-              <a:t>1/26/18</a:t>
+              <a:t>2/10/18</a:t>
             </a:fld>
             <a:endParaRPr lang="en-US"/>
           </a:p>
@@ -1940,7 +1940,7 @@
           <a:p>
             <a:fld id="{93E1D4DC-B837-664D-AE6B-C6841DC5E297}" type="datetimeFigureOut">
               <a:rPr lang="en-US" smtClean="0"/>
-              <a:t>1/26/18</a:t>
+              <a:t>2/10/18</a:t>
             </a:fld>
             <a:endParaRPr lang="en-US"/>
           </a:p>
@@ -2053,7 +2053,7 @@
           <a:p>
             <a:fld id="{93E1D4DC-B837-664D-AE6B-C6841DC5E297}" type="datetimeFigureOut">
               <a:rPr lang="en-US" smtClean="0"/>
-              <a:t>1/26/18</a:t>
+              <a:t>2/10/18</a:t>
             </a:fld>
             <a:endParaRPr lang="en-US"/>
           </a:p>
@@ -2143,7 +2143,7 @@
           <a:p>
             <a:fld id="{93E1D4DC-B837-664D-AE6B-C6841DC5E297}" type="datetimeFigureOut">
               <a:rPr lang="en-US" smtClean="0"/>
-              <a:t>1/26/18</a:t>
+              <a:t>2/10/18</a:t>
             </a:fld>
             <a:endParaRPr lang="en-US"/>
           </a:p>
@@ -2415,7 +2415,7 @@
           <a:p>
             <a:fld id="{93E1D4DC-B837-664D-AE6B-C6841DC5E297}" type="datetimeFigureOut">
               <a:rPr lang="en-US" smtClean="0"/>
-              <a:t>1/26/18</a:t>
+              <a:t>2/10/18</a:t>
             </a:fld>
             <a:endParaRPr lang="en-US"/>
           </a:p>
@@ -2667,7 +2667,7 @@
           <a:p>
             <a:fld id="{93E1D4DC-B837-664D-AE6B-C6841DC5E297}" type="datetimeFigureOut">
               <a:rPr lang="en-US" smtClean="0"/>
-              <a:t>1/26/18</a:t>
+              <a:t>2/10/18</a:t>
             </a:fld>
             <a:endParaRPr lang="en-US"/>
           </a:p>
@@ -2875,7 +2875,7 @@
           <a:p>
             <a:fld id="{93E1D4DC-B837-664D-AE6B-C6841DC5E297}" type="datetimeFigureOut">
               <a:rPr lang="en-US" smtClean="0"/>
-              <a:t>1/26/18</a:t>
+              <a:t>2/10/18</a:t>
             </a:fld>
             <a:endParaRPr lang="en-US"/>
           </a:p>
@@ -3282,14 +3282,190 @@
       </p:grpSpPr>
       <p:pic>
         <p:nvPicPr>
-          <p:cNvPr id="7" name="Picture 6"/>
+          <p:cNvPr id="15" name="Picture 14"/>
+          <p:cNvPicPr>
+            <a:picLocks noChangeAspect="1"/>
+          </p:cNvPicPr>
+          <p:nvPr/>
+        </p:nvPicPr>
+        <p:blipFill rotWithShape="1">
+          <a:blip r:embed="rId2">
+            <a:extLst>
+              <a:ext uri="{28A0092B-C50C-407E-A947-70E740481C1C}">
+                <a14:useLocalDpi xmlns:a14="http://schemas.microsoft.com/office/drawing/2010/main" val="0"/>
+              </a:ext>
+            </a:extLst>
+          </a:blip>
+          <a:srcRect t="17444" b="-1"/>
+          <a:stretch/>
+        </p:blipFill>
+        <p:spPr>
+          <a:xfrm>
+            <a:off x="-2" y="11331752"/>
+            <a:ext cx="12192000" cy="2516327"/>
+          </a:xfrm>
+          <a:prstGeom prst="rect">
+            <a:avLst/>
+          </a:prstGeom>
+        </p:spPr>
+      </p:pic>
+      <p:sp>
+        <p:nvSpPr>
+          <p:cNvPr id="20" name="TextBox 19"/>
+          <p:cNvSpPr txBox="1"/>
+          <p:nvPr/>
+        </p:nvSpPr>
+        <p:spPr>
+          <a:xfrm>
+            <a:off x="0" y="0"/>
+            <a:ext cx="735983" cy="630942"/>
+          </a:xfrm>
+          <a:prstGeom prst="rect">
+            <a:avLst/>
+          </a:prstGeom>
+          <a:noFill/>
+        </p:spPr>
+        <p:txBody>
+          <a:bodyPr wrap="square" rtlCol="0">
+            <a:spAutoFit/>
+          </a:bodyPr>
+          <a:lstStyle/>
+          <a:p>
+            <a:r>
+              <a:rPr lang="en-US" sz="3500" b="1" smtClean="0">
+                <a:latin typeface="Arial" charset="0"/>
+                <a:ea typeface="Arial" charset="0"/>
+                <a:cs typeface="Arial" charset="0"/>
+              </a:rPr>
+              <a:t>A</a:t>
+            </a:r>
+            <a:endParaRPr lang="en-US" sz="3500" b="1">
+              <a:latin typeface="Arial" charset="0"/>
+              <a:ea typeface="Arial" charset="0"/>
+              <a:cs typeface="Arial" charset="0"/>
+            </a:endParaRPr>
+          </a:p>
+        </p:txBody>
+      </p:sp>
+      <p:sp>
+        <p:nvSpPr>
+          <p:cNvPr id="21" name="TextBox 20"/>
+          <p:cNvSpPr txBox="1"/>
+          <p:nvPr/>
+        </p:nvSpPr>
+        <p:spPr>
+          <a:xfrm>
+            <a:off x="-1" y="5119020"/>
+            <a:ext cx="735983" cy="630942"/>
+          </a:xfrm>
+          <a:prstGeom prst="rect">
+            <a:avLst/>
+          </a:prstGeom>
+          <a:noFill/>
+        </p:spPr>
+        <p:txBody>
+          <a:bodyPr wrap="square" rtlCol="0">
+            <a:spAutoFit/>
+          </a:bodyPr>
+          <a:lstStyle/>
+          <a:p>
+            <a:r>
+              <a:rPr lang="en-US" sz="3500" b="1" dirty="0">
+                <a:latin typeface="Arial" charset="0"/>
+                <a:ea typeface="Arial" charset="0"/>
+                <a:cs typeface="Arial" charset="0"/>
+              </a:rPr>
+              <a:t>B</a:t>
+            </a:r>
+          </a:p>
+        </p:txBody>
+      </p:sp>
+      <p:sp>
+        <p:nvSpPr>
+          <p:cNvPr id="22" name="TextBox 21"/>
+          <p:cNvSpPr txBox="1"/>
+          <p:nvPr/>
+        </p:nvSpPr>
+        <p:spPr>
+          <a:xfrm>
+            <a:off x="-2" y="8831315"/>
+            <a:ext cx="1003612" cy="630942"/>
+          </a:xfrm>
+          <a:prstGeom prst="rect">
+            <a:avLst/>
+          </a:prstGeom>
+          <a:noFill/>
+        </p:spPr>
+        <p:txBody>
+          <a:bodyPr wrap="square" rtlCol="0">
+            <a:spAutoFit/>
+          </a:bodyPr>
+          <a:lstStyle/>
+          <a:p>
+            <a:r>
+              <a:rPr lang="en-US" sz="3500" b="1" smtClean="0">
+                <a:latin typeface="Arial" charset="0"/>
+                <a:ea typeface="Arial" charset="0"/>
+                <a:cs typeface="Arial" charset="0"/>
+              </a:rPr>
+              <a:t>C1</a:t>
+            </a:r>
+            <a:endParaRPr lang="en-US" sz="3500" b="1">
+              <a:latin typeface="Arial" charset="0"/>
+              <a:ea typeface="Arial" charset="0"/>
+              <a:cs typeface="Arial" charset="0"/>
+            </a:endParaRPr>
+          </a:p>
+        </p:txBody>
+      </p:sp>
+      <p:sp>
+        <p:nvSpPr>
+          <p:cNvPr id="23" name="TextBox 22"/>
+          <p:cNvSpPr txBox="1"/>
+          <p:nvPr/>
+        </p:nvSpPr>
+        <p:spPr>
+          <a:xfrm>
+            <a:off x="-2" y="10700810"/>
+            <a:ext cx="1003612" cy="630942"/>
+          </a:xfrm>
+          <a:prstGeom prst="rect">
+            <a:avLst/>
+          </a:prstGeom>
+          <a:noFill/>
+        </p:spPr>
+        <p:txBody>
+          <a:bodyPr wrap="square" rtlCol="0">
+            <a:spAutoFit/>
+          </a:bodyPr>
+          <a:lstStyle/>
+          <a:p>
+            <a:r>
+              <a:rPr lang="en-US" sz="3500" b="1" dirty="0" smtClean="0">
+                <a:latin typeface="Arial" charset="0"/>
+                <a:ea typeface="Arial" charset="0"/>
+                <a:cs typeface="Arial" charset="0"/>
+              </a:rPr>
+              <a:t>C2</a:t>
+            </a:r>
+            <a:endParaRPr lang="en-US" sz="3500" b="1" dirty="0">
+              <a:latin typeface="Arial" charset="0"/>
+              <a:ea typeface="Arial" charset="0"/>
+              <a:cs typeface="Arial" charset="0"/>
+            </a:endParaRPr>
+          </a:p>
+        </p:txBody>
+      </p:sp>
+      <p:pic>
+        <p:nvPicPr>
+          <p:cNvPr id="2" name="Picture 1"/>
           <p:cNvPicPr>
             <a:picLocks noChangeAspect="1"/>
           </p:cNvPicPr>
           <p:nvPr/>
         </p:nvPicPr>
         <p:blipFill>
-          <a:blip r:embed="rId2">
+          <a:blip r:embed="rId3">
             <a:extLst>
               <a:ext uri="{28A0092B-C50C-407E-A947-70E740481C1C}">
                 <a14:useLocalDpi xmlns:a14="http://schemas.microsoft.com/office/drawing/2010/main" val="0"/>
@@ -3302,8 +3478,8 @@
         </p:blipFill>
         <p:spPr>
           <a:xfrm>
-            <a:off x="0" y="11352213"/>
-            <a:ext cx="12192000" cy="3048000"/>
+            <a:off x="1003610" y="65543"/>
+            <a:ext cx="5367194" cy="2683597"/>
           </a:xfrm>
           <a:prstGeom prst="rect">
             <a:avLst/>
@@ -3312,36 +3488,7 @@
       </p:pic>
       <p:pic>
         <p:nvPicPr>
-          <p:cNvPr id="9" name="Picture 8"/>
-          <p:cNvPicPr>
-            <a:picLocks noChangeAspect="1"/>
-          </p:cNvPicPr>
-          <p:nvPr/>
-        </p:nvPicPr>
-        <p:blipFill rotWithShape="1">
-          <a:blip r:embed="rId3">
-            <a:extLst>
-              <a:ext uri="{28A0092B-C50C-407E-A947-70E740481C1C}">
-                <a14:useLocalDpi xmlns:a14="http://schemas.microsoft.com/office/drawing/2010/main" val="0"/>
-              </a:ext>
-            </a:extLst>
-          </a:blip>
-          <a:srcRect t="28023" b="31001"/>
-          <a:stretch/>
-        </p:blipFill>
-        <p:spPr>
-          <a:xfrm>
-            <a:off x="0" y="9211179"/>
-            <a:ext cx="12192000" cy="2141034"/>
-          </a:xfrm>
-          <a:prstGeom prst="rect">
-            <a:avLst/>
-          </a:prstGeom>
-        </p:spPr>
-      </p:pic>
-      <p:pic>
-        <p:nvPicPr>
-          <p:cNvPr id="10" name="Picture 9"/>
+          <p:cNvPr id="3" name="Picture 2"/>
           <p:cNvPicPr>
             <a:picLocks noChangeAspect="1"/>
           </p:cNvPicPr>
@@ -3361,164 +3508,17 @@
         </p:blipFill>
         <p:spPr>
           <a:xfrm>
-            <a:off x="-2" y="5400684"/>
-            <a:ext cx="12192000" cy="3483429"/>
+            <a:off x="6370804" y="65542"/>
+            <a:ext cx="5367194" cy="2683597"/>
           </a:xfrm>
           <a:prstGeom prst="rect">
             <a:avLst/>
           </a:prstGeom>
         </p:spPr>
       </p:pic>
-      <p:sp>
-        <p:nvSpPr>
-          <p:cNvPr id="20" name="TextBox 19"/>
-          <p:cNvSpPr txBox="1"/>
-          <p:nvPr/>
-        </p:nvSpPr>
-        <p:spPr>
-          <a:xfrm>
-            <a:off x="0" y="0"/>
-            <a:ext cx="735983" cy="630942"/>
-          </a:xfrm>
-          <a:prstGeom prst="rect">
-            <a:avLst/>
-          </a:prstGeom>
-          <a:noFill/>
-        </p:spPr>
-        <p:txBody>
-          <a:bodyPr wrap="square" rtlCol="0">
-            <a:spAutoFit/>
-          </a:bodyPr>
-          <a:lstStyle/>
-          <a:p>
-            <a:r>
-              <a:rPr lang="en-US" sz="3500" b="1" smtClean="0">
-                <a:latin typeface="Arial" charset="0"/>
-                <a:ea typeface="Arial" charset="0"/>
-                <a:cs typeface="Arial" charset="0"/>
-              </a:rPr>
-              <a:t>A</a:t>
-            </a:r>
-            <a:endParaRPr lang="en-US" sz="3500" b="1">
-              <a:latin typeface="Arial" charset="0"/>
-              <a:ea typeface="Arial" charset="0"/>
-              <a:cs typeface="Arial" charset="0"/>
-            </a:endParaRPr>
-          </a:p>
-        </p:txBody>
-      </p:sp>
-      <p:sp>
-        <p:nvSpPr>
-          <p:cNvPr id="21" name="TextBox 20"/>
-          <p:cNvSpPr txBox="1"/>
-          <p:nvPr/>
-        </p:nvSpPr>
-        <p:spPr>
-          <a:xfrm>
-            <a:off x="-1" y="5119020"/>
-            <a:ext cx="735983" cy="630942"/>
-          </a:xfrm>
-          <a:prstGeom prst="rect">
-            <a:avLst/>
-          </a:prstGeom>
-          <a:noFill/>
-        </p:spPr>
-        <p:txBody>
-          <a:bodyPr wrap="square" rtlCol="0">
-            <a:spAutoFit/>
-          </a:bodyPr>
-          <a:lstStyle/>
-          <a:p>
-            <a:r>
-              <a:rPr lang="en-US" sz="3500" b="1" dirty="0">
-                <a:latin typeface="Arial" charset="0"/>
-                <a:ea typeface="Arial" charset="0"/>
-                <a:cs typeface="Arial" charset="0"/>
-              </a:rPr>
-              <a:t>B</a:t>
-            </a:r>
-          </a:p>
-        </p:txBody>
-      </p:sp>
-      <p:sp>
-        <p:nvSpPr>
-          <p:cNvPr id="22" name="TextBox 21"/>
-          <p:cNvSpPr txBox="1"/>
-          <p:nvPr/>
-        </p:nvSpPr>
-        <p:spPr>
-          <a:xfrm>
-            <a:off x="-2" y="8632759"/>
-            <a:ext cx="1003612" cy="630942"/>
-          </a:xfrm>
-          <a:prstGeom prst="rect">
-            <a:avLst/>
-          </a:prstGeom>
-          <a:noFill/>
-        </p:spPr>
-        <p:txBody>
-          <a:bodyPr wrap="square" rtlCol="0">
-            <a:spAutoFit/>
-          </a:bodyPr>
-          <a:lstStyle/>
-          <a:p>
-            <a:r>
-              <a:rPr lang="en-US" sz="3500" b="1" smtClean="0">
-                <a:latin typeface="Arial" charset="0"/>
-                <a:ea typeface="Arial" charset="0"/>
-                <a:cs typeface="Arial" charset="0"/>
-              </a:rPr>
-              <a:t>C1</a:t>
-            </a:r>
-            <a:endParaRPr lang="en-US" sz="3500" b="1">
-              <a:latin typeface="Arial" charset="0"/>
-              <a:ea typeface="Arial" charset="0"/>
-              <a:cs typeface="Arial" charset="0"/>
-            </a:endParaRPr>
-          </a:p>
-        </p:txBody>
-      </p:sp>
-      <p:sp>
-        <p:nvSpPr>
-          <p:cNvPr id="23" name="TextBox 22"/>
-          <p:cNvSpPr txBox="1"/>
-          <p:nvPr/>
-        </p:nvSpPr>
-        <p:spPr>
-          <a:xfrm>
-            <a:off x="-2" y="11201015"/>
-            <a:ext cx="1003612" cy="630942"/>
-          </a:xfrm>
-          <a:prstGeom prst="rect">
-            <a:avLst/>
-          </a:prstGeom>
-          <a:noFill/>
-        </p:spPr>
-        <p:txBody>
-          <a:bodyPr wrap="square" rtlCol="0">
-            <a:spAutoFit/>
-          </a:bodyPr>
-          <a:lstStyle/>
-          <a:p>
-            <a:r>
-              <a:rPr lang="en-US" sz="3500" b="1" dirty="0" smtClean="0">
-                <a:latin typeface="Arial" charset="0"/>
-                <a:ea typeface="Arial" charset="0"/>
-                <a:cs typeface="Arial" charset="0"/>
-              </a:rPr>
-              <a:t>C2</a:t>
-            </a:r>
-            <a:endParaRPr lang="en-US" sz="3500" b="1" dirty="0">
-              <a:latin typeface="Arial" charset="0"/>
-              <a:ea typeface="Arial" charset="0"/>
-              <a:cs typeface="Arial" charset="0"/>
-            </a:endParaRPr>
-          </a:p>
-        </p:txBody>
-      </p:sp>
       <p:pic>
         <p:nvPicPr>
-          <p:cNvPr id="6" name="Picture 5"/>
+          <p:cNvPr id="4" name="Picture 3"/>
           <p:cNvPicPr>
             <a:picLocks noChangeAspect="1"/>
           </p:cNvPicPr>
@@ -3538,8 +3538,8 @@
         </p:blipFill>
         <p:spPr>
           <a:xfrm>
-            <a:off x="735982" y="65543"/>
-            <a:ext cx="5369982" cy="2684991"/>
+            <a:off x="1003610" y="2642950"/>
+            <a:ext cx="5367193" cy="2683597"/>
           </a:xfrm>
           <a:prstGeom prst="rect">
             <a:avLst/>
@@ -3548,7 +3548,7 @@
       </p:pic>
       <p:pic>
         <p:nvPicPr>
-          <p:cNvPr id="8" name="Picture 7"/>
+          <p:cNvPr id="5" name="Picture 4"/>
           <p:cNvPicPr>
             <a:picLocks noChangeAspect="1"/>
           </p:cNvPicPr>
@@ -3568,8 +3568,8 @@
         </p:blipFill>
         <p:spPr>
           <a:xfrm>
-            <a:off x="735980" y="2658566"/>
-            <a:ext cx="5393279" cy="2696641"/>
+            <a:off x="6370803" y="2685350"/>
+            <a:ext cx="5282394" cy="2641197"/>
           </a:xfrm>
           <a:prstGeom prst="rect">
             <a:avLst/>
@@ -3578,7 +3578,7 @@
       </p:pic>
       <p:pic>
         <p:nvPicPr>
-          <p:cNvPr id="11" name="Picture 10"/>
+          <p:cNvPr id="13" name="Picture 12"/>
           <p:cNvPicPr>
             <a:picLocks noChangeAspect="1"/>
           </p:cNvPicPr>
@@ -3598,8 +3598,8 @@
         </p:blipFill>
         <p:spPr>
           <a:xfrm>
-            <a:off x="5916414" y="65543"/>
-            <a:ext cx="5369982" cy="2684991"/>
+            <a:off x="0" y="5368946"/>
+            <a:ext cx="12192000" cy="3483429"/>
           </a:xfrm>
           <a:prstGeom prst="rect">
             <a:avLst/>
@@ -3608,13 +3608,13 @@
       </p:pic>
       <p:pic>
         <p:nvPicPr>
-          <p:cNvPr id="12" name="Picture 11"/>
+          <p:cNvPr id="14" name="Picture 13"/>
           <p:cNvPicPr>
             <a:picLocks noChangeAspect="1"/>
           </p:cNvPicPr>
           <p:nvPr/>
         </p:nvPicPr>
-        <p:blipFill>
+        <p:blipFill rotWithShape="1">
           <a:blip r:embed="rId8">
             <a:extLst>
               <a:ext uri="{28A0092B-C50C-407E-A947-70E740481C1C}">
@@ -3622,14 +3622,13 @@
               </a:ext>
             </a:extLst>
           </a:blip>
-          <a:stretch>
-            <a:fillRect/>
-          </a:stretch>
+          <a:srcRect t="28001" b="29733"/>
+          <a:stretch/>
         </p:blipFill>
         <p:spPr>
           <a:xfrm>
-            <a:off x="5881426" y="2652722"/>
-            <a:ext cx="5404969" cy="2702485"/>
+            <a:off x="490654" y="9352580"/>
+            <a:ext cx="11701346" cy="2119602"/>
           </a:xfrm>
           <a:prstGeom prst="rect">
             <a:avLst/>

</xml_diff>